<commit_message>
Match 9th before lunch
</commit_message>
<xml_diff>
--- a/Presentation material/measurement_survey_instructions.pptx
+++ b/Presentation material/measurement_survey_instructions.pptx
@@ -6683,29 +6683,43 @@
             <a:pPr algn="just"/>
             <a:r>
               <a:rPr lang="en-US" dirty="0" smtClean="0"/>
-              <a:t>Take one of the identifiers.</a:t>
+              <a:t>Take </a:t>
+            </a:r>
+            <a:r>
+              <a:rPr lang="en-US" dirty="0" smtClean="0"/>
+              <a:t>two copies of one </a:t>
+            </a:r>
+            <a:r>
+              <a:rPr lang="en-US" dirty="0" smtClean="0"/>
+              <a:t>of the identifiers.</a:t>
             </a:r>
           </a:p>
           <a:p>
             <a:pPr algn="just"/>
             <a:r>
               <a:rPr lang="en-US" dirty="0" smtClean="0"/>
-              <a:t>Memorize it.</a:t>
+              <a:t>Write </a:t>
+            </a:r>
+            <a:r>
+              <a:rPr lang="en-US" dirty="0" smtClean="0"/>
+              <a:t>the role you will use during the survey on </a:t>
+            </a:r>
+            <a:r>
+              <a:rPr lang="en-US" dirty="0" smtClean="0"/>
+              <a:t>one of them and put it back.</a:t>
             </a:r>
           </a:p>
           <a:p>
             <a:pPr algn="just"/>
             <a:r>
               <a:rPr lang="en-US" dirty="0" smtClean="0"/>
-              <a:t>Write the role you will use during the survey on the paper.</a:t>
-            </a:r>
-          </a:p>
-          <a:p>
-            <a:pPr algn="just"/>
-            <a:r>
-              <a:rPr lang="en-US" dirty="0" smtClean="0"/>
-              <a:t>Put it back.</a:t>
-            </a:r>
+              <a:t>The other one is for you to keep so you can answer the corresponding question in the survey</a:t>
+            </a:r>
+            <a:r>
+              <a:rPr lang="en-US" dirty="0" smtClean="0"/>
+              <a:t>.</a:t>
+            </a:r>
+            <a:endParaRPr lang="en-US" dirty="0" smtClean="0"/>
           </a:p>
           <a:p>
             <a:pPr algn="just"/>
@@ -6713,9 +6727,17 @@
           </a:p>
           <a:p>
             <a:pPr algn="just"/>
-            <a:r>
-              <a:rPr lang="en-US" dirty="0" smtClean="0"/>
-              <a:t>I will use this to be able to know which information belongs to each role and teams without revealing your identities.</a:t>
+            <a:endParaRPr lang="en-US" dirty="0" smtClean="0"/>
+          </a:p>
+          <a:p>
+            <a:pPr algn="just"/>
+            <a:r>
+              <a:rPr lang="en-US" dirty="0" smtClean="0"/>
+              <a:t>I </a:t>
+            </a:r>
+            <a:r>
+              <a:rPr lang="en-US" dirty="0" smtClean="0"/>
+              <a:t>will use this to be able to know which information belongs to each role and teams without revealing your identities.</a:t>
             </a:r>
             <a:endParaRPr lang="en-US" dirty="0"/>
           </a:p>

</xml_diff>